<commit_message>
Correção de slides e projeto
</commit_message>
<xml_diff>
--- a/documentos/apresentacao_final.pptx
+++ b/documentos/apresentacao_final.pptx
@@ -7,20 +7,21 @@
   <p:sldIdLst>
     <p:sldId id="256" r:id="rId2"/>
     <p:sldId id="268" r:id="rId3"/>
-    <p:sldId id="257" r:id="rId4"/>
-    <p:sldId id="267" r:id="rId5"/>
-    <p:sldId id="258" r:id="rId6"/>
-    <p:sldId id="259" r:id="rId7"/>
-    <p:sldId id="269" r:id="rId8"/>
-    <p:sldId id="260" r:id="rId9"/>
-    <p:sldId id="261" r:id="rId10"/>
-    <p:sldId id="270" r:id="rId11"/>
-    <p:sldId id="264" r:id="rId12"/>
-    <p:sldId id="271" r:id="rId13"/>
-    <p:sldId id="265" r:id="rId14"/>
-    <p:sldId id="266" r:id="rId15"/>
-    <p:sldId id="272" r:id="rId16"/>
-    <p:sldId id="273" r:id="rId17"/>
+    <p:sldId id="274" r:id="rId4"/>
+    <p:sldId id="257" r:id="rId5"/>
+    <p:sldId id="267" r:id="rId6"/>
+    <p:sldId id="258" r:id="rId7"/>
+    <p:sldId id="259" r:id="rId8"/>
+    <p:sldId id="269" r:id="rId9"/>
+    <p:sldId id="260" r:id="rId10"/>
+    <p:sldId id="261" r:id="rId11"/>
+    <p:sldId id="270" r:id="rId12"/>
+    <p:sldId id="264" r:id="rId13"/>
+    <p:sldId id="271" r:id="rId14"/>
+    <p:sldId id="265" r:id="rId15"/>
+    <p:sldId id="266" r:id="rId16"/>
+    <p:sldId id="272" r:id="rId17"/>
+    <p:sldId id="273" r:id="rId18"/>
   </p:sldIdLst>
   <p:sldSz cx="12192000" cy="6858000"/>
   <p:notesSz cx="6858000" cy="9144000"/>
@@ -312,7 +313,7 @@
           <a:p>
             <a:fld id="{89A945EC-9B80-4B3A-B548-6FCB9E909891}" type="datetimeFigureOut">
               <a:rPr lang="pt-BR" smtClean="0"/>
-              <a:t>02/09/2021</a:t>
+              <a:t>03/09/2021</a:t>
             </a:fld>
             <a:endParaRPr lang="pt-BR"/>
           </a:p>
@@ -610,7 +611,7 @@
           <a:p>
             <a:fld id="{89A945EC-9B80-4B3A-B548-6FCB9E909891}" type="datetimeFigureOut">
               <a:rPr lang="pt-BR" smtClean="0"/>
-              <a:t>02/09/2021</a:t>
+              <a:t>03/09/2021</a:t>
             </a:fld>
             <a:endParaRPr lang="pt-BR"/>
           </a:p>
@@ -802,7 +803,7 @@
           <a:p>
             <a:fld id="{89A945EC-9B80-4B3A-B548-6FCB9E909891}" type="datetimeFigureOut">
               <a:rPr lang="pt-BR" smtClean="0"/>
-              <a:t>02/09/2021</a:t>
+              <a:t>03/09/2021</a:t>
             </a:fld>
             <a:endParaRPr lang="pt-BR"/>
           </a:p>
@@ -1063,7 +1064,7 @@
           <a:p>
             <a:fld id="{89A945EC-9B80-4B3A-B548-6FCB9E909891}" type="datetimeFigureOut">
               <a:rPr lang="pt-BR" smtClean="0"/>
-              <a:t>02/09/2021</a:t>
+              <a:t>03/09/2021</a:t>
             </a:fld>
             <a:endParaRPr lang="pt-BR"/>
           </a:p>
@@ -1487,7 +1488,7 @@
           <a:p>
             <a:fld id="{89A945EC-9B80-4B3A-B548-6FCB9E909891}" type="datetimeFigureOut">
               <a:rPr lang="pt-BR" smtClean="0"/>
-              <a:t>02/09/2021</a:t>
+              <a:t>03/09/2021</a:t>
             </a:fld>
             <a:endParaRPr lang="pt-BR"/>
           </a:p>
@@ -2024,7 +2025,7 @@
           <a:p>
             <a:fld id="{89A945EC-9B80-4B3A-B548-6FCB9E909891}" type="datetimeFigureOut">
               <a:rPr lang="pt-BR" smtClean="0"/>
-              <a:t>02/09/2021</a:t>
+              <a:t>03/09/2021</a:t>
             </a:fld>
             <a:endParaRPr lang="pt-BR"/>
           </a:p>
@@ -2888,7 +2889,7 @@
           <a:p>
             <a:fld id="{89A945EC-9B80-4B3A-B548-6FCB9E909891}" type="datetimeFigureOut">
               <a:rPr lang="pt-BR" smtClean="0"/>
-              <a:t>02/09/2021</a:t>
+              <a:t>03/09/2021</a:t>
             </a:fld>
             <a:endParaRPr lang="pt-BR"/>
           </a:p>
@@ -3058,7 +3059,7 @@
           <a:p>
             <a:fld id="{89A945EC-9B80-4B3A-B548-6FCB9E909891}" type="datetimeFigureOut">
               <a:rPr lang="pt-BR" smtClean="0"/>
-              <a:t>02/09/2021</a:t>
+              <a:t>03/09/2021</a:t>
             </a:fld>
             <a:endParaRPr lang="pt-BR"/>
           </a:p>
@@ -3242,7 +3243,7 @@
           <a:p>
             <a:fld id="{89A945EC-9B80-4B3A-B548-6FCB9E909891}" type="datetimeFigureOut">
               <a:rPr lang="pt-BR" smtClean="0"/>
-              <a:t>02/09/2021</a:t>
+              <a:t>03/09/2021</a:t>
             </a:fld>
             <a:endParaRPr lang="pt-BR"/>
           </a:p>
@@ -3412,7 +3413,7 @@
           <a:p>
             <a:fld id="{89A945EC-9B80-4B3A-B548-6FCB9E909891}" type="datetimeFigureOut">
               <a:rPr lang="pt-BR" smtClean="0"/>
-              <a:t>02/09/2021</a:t>
+              <a:t>03/09/2021</a:t>
             </a:fld>
             <a:endParaRPr lang="pt-BR"/>
           </a:p>
@@ -3656,7 +3657,7 @@
           <a:p>
             <a:fld id="{89A945EC-9B80-4B3A-B548-6FCB9E909891}" type="datetimeFigureOut">
               <a:rPr lang="pt-BR" smtClean="0"/>
-              <a:t>02/09/2021</a:t>
+              <a:t>03/09/2021</a:t>
             </a:fld>
             <a:endParaRPr lang="pt-BR"/>
           </a:p>
@@ -3892,7 +3893,7 @@
           <a:p>
             <a:fld id="{89A945EC-9B80-4B3A-B548-6FCB9E909891}" type="datetimeFigureOut">
               <a:rPr lang="pt-BR" smtClean="0"/>
-              <a:t>02/09/2021</a:t>
+              <a:t>03/09/2021</a:t>
             </a:fld>
             <a:endParaRPr lang="pt-BR"/>
           </a:p>
@@ -4358,7 +4359,7 @@
           <a:p>
             <a:fld id="{89A945EC-9B80-4B3A-B548-6FCB9E909891}" type="datetimeFigureOut">
               <a:rPr lang="pt-BR" smtClean="0"/>
-              <a:t>02/09/2021</a:t>
+              <a:t>03/09/2021</a:t>
             </a:fld>
             <a:endParaRPr lang="pt-BR"/>
           </a:p>
@@ -4476,7 +4477,7 @@
           <a:p>
             <a:fld id="{89A945EC-9B80-4B3A-B548-6FCB9E909891}" type="datetimeFigureOut">
               <a:rPr lang="pt-BR" smtClean="0"/>
-              <a:t>02/09/2021</a:t>
+              <a:t>03/09/2021</a:t>
             </a:fld>
             <a:endParaRPr lang="pt-BR"/>
           </a:p>
@@ -4571,7 +4572,7 @@
           <a:p>
             <a:fld id="{89A945EC-9B80-4B3A-B548-6FCB9E909891}" type="datetimeFigureOut">
               <a:rPr lang="pt-BR" smtClean="0"/>
-              <a:t>02/09/2021</a:t>
+              <a:t>03/09/2021</a:t>
             </a:fld>
             <a:endParaRPr lang="pt-BR"/>
           </a:p>
@@ -4826,7 +4827,7 @@
           <a:p>
             <a:fld id="{89A945EC-9B80-4B3A-B548-6FCB9E909891}" type="datetimeFigureOut">
               <a:rPr lang="pt-BR" smtClean="0"/>
-              <a:t>02/09/2021</a:t>
+              <a:t>03/09/2021</a:t>
             </a:fld>
             <a:endParaRPr lang="pt-BR"/>
           </a:p>
@@ -5126,7 +5127,7 @@
           <a:p>
             <a:fld id="{89A945EC-9B80-4B3A-B548-6FCB9E909891}" type="datetimeFigureOut">
               <a:rPr lang="pt-BR" smtClean="0"/>
-              <a:t>02/09/2021</a:t>
+              <a:t>03/09/2021</a:t>
             </a:fld>
             <a:endParaRPr lang="pt-BR"/>
           </a:p>
@@ -5360,7 +5361,7 @@
           <a:p>
             <a:fld id="{89A945EC-9B80-4B3A-B548-6FCB9E909891}" type="datetimeFigureOut">
               <a:rPr lang="pt-BR" smtClean="0"/>
-              <a:t>02/09/2021</a:t>
+              <a:t>03/09/2021</a:t>
             </a:fld>
             <a:endParaRPr lang="pt-BR"/>
           </a:p>
@@ -6175,6 +6176,107 @@
       </p:grpSpPr>
       <p:sp>
         <p:nvSpPr>
+          <p:cNvPr id="2" name="Título 1">
+            <a:extLst>
+              <a:ext uri="{FF2B5EF4-FFF2-40B4-BE49-F238E27FC236}">
+                <a16:creationId xmlns:a16="http://schemas.microsoft.com/office/drawing/2014/main" id="{664A4A65-72EC-442E-8632-9ABE2296F788}"/>
+              </a:ext>
+            </a:extLst>
+          </p:cNvPr>
+          <p:cNvSpPr>
+            <a:spLocks noGrp="1"/>
+          </p:cNvSpPr>
+          <p:nvPr>
+            <p:ph type="title"/>
+          </p:nvPr>
+        </p:nvSpPr>
+        <p:spPr>
+          <a:xfrm>
+            <a:off x="913795" y="0"/>
+            <a:ext cx="10353762" cy="970450"/>
+          </a:xfrm>
+        </p:spPr>
+        <p:txBody>
+          <a:bodyPr>
+            <a:normAutofit/>
+          </a:bodyPr>
+          <a:lstStyle/>
+          <a:p>
+            <a:r>
+              <a:rPr lang="pt-BR" sz="4800" dirty="0"/>
+              <a:t>Exemplo de retorno da cotação</a:t>
+            </a:r>
+          </a:p>
+        </p:txBody>
+      </p:sp>
+      <p:pic>
+        <p:nvPicPr>
+          <p:cNvPr id="4" name="Imagem 3">
+            <a:extLst>
+              <a:ext uri="{FF2B5EF4-FFF2-40B4-BE49-F238E27FC236}">
+                <a16:creationId xmlns:a16="http://schemas.microsoft.com/office/drawing/2014/main" id="{184BB44E-800F-4463-9C23-ED88B6ED9B02}"/>
+              </a:ext>
+            </a:extLst>
+          </p:cNvPr>
+          <p:cNvPicPr>
+            <a:picLocks noChangeAspect="1"/>
+          </p:cNvPicPr>
+          <p:nvPr/>
+        </p:nvPicPr>
+        <p:blipFill>
+          <a:blip r:embed="rId2">
+            <a:extLst>
+              <a:ext uri="{28A0092B-C50C-407E-A947-70E740481C1C}">
+                <a14:useLocalDpi xmlns:a14="http://schemas.microsoft.com/office/drawing/2010/main" val="0"/>
+              </a:ext>
+            </a:extLst>
+          </a:blip>
+          <a:stretch>
+            <a:fillRect/>
+          </a:stretch>
+        </p:blipFill>
+        <p:spPr>
+          <a:xfrm>
+            <a:off x="2198657" y="938102"/>
+            <a:ext cx="7784037" cy="5919898"/>
+          </a:xfrm>
+          <a:prstGeom prst="rect">
+            <a:avLst/>
+          </a:prstGeom>
+        </p:spPr>
+      </p:pic>
+    </p:spTree>
+    <p:extLst>
+      <p:ext uri="{BB962C8B-B14F-4D97-AF65-F5344CB8AC3E}">
+        <p14:creationId xmlns:p14="http://schemas.microsoft.com/office/powerpoint/2010/main" val="1719743760"/>
+      </p:ext>
+    </p:extLst>
+  </p:cSld>
+  <p:clrMapOvr>
+    <a:masterClrMapping/>
+  </p:clrMapOvr>
+</p:sld>
+</file>
+
+<file path=ppt/slides/slide11.xml><?xml version="1.0" encoding="utf-8"?>
+<p:sld xmlns:a="http://schemas.openxmlformats.org/drawingml/2006/main" xmlns:r="http://schemas.openxmlformats.org/officeDocument/2006/relationships" xmlns:p="http://schemas.openxmlformats.org/presentationml/2006/main">
+  <p:cSld>
+    <p:spTree>
+      <p:nvGrpSpPr>
+        <p:cNvPr id="1" name=""/>
+        <p:cNvGrpSpPr/>
+        <p:nvPr/>
+      </p:nvGrpSpPr>
+      <p:grpSpPr>
+        <a:xfrm>
+          <a:off x="0" y="0"/>
+          <a:ext cx="0" cy="0"/>
+          <a:chOff x="0" y="0"/>
+          <a:chExt cx="0" cy="0"/>
+        </a:xfrm>
+      </p:grpSpPr>
+      <p:sp>
+        <p:nvSpPr>
           <p:cNvPr id="3" name="Espaço Reservado para Conteúdo 2">
             <a:extLst>
               <a:ext uri="{FF2B5EF4-FFF2-40B4-BE49-F238E27FC236}">
@@ -6294,7 +6396,7 @@
 </p:sld>
 </file>
 
-<file path=ppt/slides/slide11.xml><?xml version="1.0" encoding="utf-8"?>
+<file path=ppt/slides/slide12.xml><?xml version="1.0" encoding="utf-8"?>
 <p:sld xmlns:a="http://schemas.openxmlformats.org/drawingml/2006/main" xmlns:r="http://schemas.openxmlformats.org/officeDocument/2006/relationships" xmlns:p="http://schemas.openxmlformats.org/presentationml/2006/main">
   <p:cSld>
     <p:spTree>
@@ -6360,7 +6462,7 @@
 </p:sld>
 </file>
 
-<file path=ppt/slides/slide12.xml><?xml version="1.0" encoding="utf-8"?>
+<file path=ppt/slides/slide13.xml><?xml version="1.0" encoding="utf-8"?>
 <p:sld xmlns:a="http://schemas.openxmlformats.org/drawingml/2006/main" xmlns:r="http://schemas.openxmlformats.org/officeDocument/2006/relationships" xmlns:p="http://schemas.openxmlformats.org/presentationml/2006/main">
   <p:cSld>
     <p:spTree>
@@ -6416,6 +6518,21 @@
             <a:endParaRPr lang="pt-BR" sz="2400" dirty="0"/>
           </a:p>
           <a:p>
+            <a:pPr lvl="1">
+              <a:lnSpc>
+                <a:spcPct val="150000"/>
+              </a:lnSpc>
+            </a:pPr>
+            <a:r>
+              <a:rPr lang="pt-BR" sz="2200" dirty="0"/>
+              <a:t>	</a:t>
+            </a:r>
+            <a:r>
+              <a:rPr lang="pt-BR" sz="2400" dirty="0"/>
+              <a:t>Retornam dados no formato JSON</a:t>
+            </a:r>
+          </a:p>
+          <a:p>
             <a:pPr>
               <a:lnSpc>
                 <a:spcPct val="150000"/>
@@ -6529,7 +6646,7 @@
 </p:sld>
 </file>
 
-<file path=ppt/slides/slide13.xml><?xml version="1.0" encoding="utf-8"?>
+<file path=ppt/slides/slide14.xml><?xml version="1.0" encoding="utf-8"?>
 <p:sld xmlns:a="http://schemas.openxmlformats.org/drawingml/2006/main" xmlns:r="http://schemas.openxmlformats.org/officeDocument/2006/relationships" xmlns:p="http://schemas.openxmlformats.org/presentationml/2006/main">
   <p:cSld>
     <p:spTree>
@@ -6634,7 +6751,7 @@
 </p:sld>
 </file>
 
-<file path=ppt/slides/slide14.xml><?xml version="1.0" encoding="utf-8"?>
+<file path=ppt/slides/slide15.xml><?xml version="1.0" encoding="utf-8"?>
 <p:sld xmlns:a="http://schemas.openxmlformats.org/drawingml/2006/main" xmlns:r="http://schemas.openxmlformats.org/officeDocument/2006/relationships" xmlns:p="http://schemas.openxmlformats.org/presentationml/2006/main">
   <p:cSld>
     <p:spTree>
@@ -6823,7 +6940,7 @@
 </p:sld>
 </file>
 
-<file path=ppt/slides/slide15.xml><?xml version="1.0" encoding="utf-8"?>
+<file path=ppt/slides/slide16.xml><?xml version="1.0" encoding="utf-8"?>
 <p:sld xmlns:a="http://schemas.openxmlformats.org/drawingml/2006/main" xmlns:r="http://schemas.openxmlformats.org/officeDocument/2006/relationships" xmlns:p="http://schemas.openxmlformats.org/presentationml/2006/main">
   <p:cSld>
     <p:spTree>
@@ -6999,7 +7116,7 @@
 </p:sld>
 </file>
 
-<file path=ppt/slides/slide16.xml><?xml version="1.0" encoding="utf-8"?>
+<file path=ppt/slides/slide17.xml><?xml version="1.0" encoding="utf-8"?>
 <p:sld xmlns:a="http://schemas.openxmlformats.org/drawingml/2006/main" xmlns:r="http://schemas.openxmlformats.org/officeDocument/2006/relationships" xmlns:p="http://schemas.openxmlformats.org/presentationml/2006/main">
   <p:cSld>
     <p:spTree>
@@ -7161,7 +7278,7 @@
           <a:p>
             <a:r>
               <a:rPr lang="pt-BR" sz="2400" dirty="0"/>
-              <a:t>Aumento de 92% do número de investidores de 2019 para 2020</a:t>
+              <a:t>Aumento de 92% do número de investidores de 2019 para 2020 no Brasil</a:t>
             </a:r>
           </a:p>
           <a:p>
@@ -7170,7 +7287,7 @@
           <a:p>
             <a:r>
               <a:rPr lang="pt-BR" sz="2400" dirty="0"/>
-              <a:t>Queda das taxas de juros</a:t>
+              <a:t>Queda da taxa de juros (SELIC) e crise econômica causada pela pandemia</a:t>
             </a:r>
           </a:p>
           <a:p>
@@ -7255,158 +7372,130 @@
           <a:chExt cx="0" cy="0"/>
         </a:xfrm>
       </p:grpSpPr>
-      <p:sp>
-        <p:nvSpPr>
-          <p:cNvPr id="2" name="Título 1">
+      <p:pic>
+        <p:nvPicPr>
+          <p:cNvPr id="5" name="Imagem 4">
             <a:extLst>
               <a:ext uri="{FF2B5EF4-FFF2-40B4-BE49-F238E27FC236}">
-                <a16:creationId xmlns:a16="http://schemas.microsoft.com/office/drawing/2014/main" id="{388AB3D3-2612-4007-923D-42D212144C15}"/>
+                <a16:creationId xmlns:a16="http://schemas.microsoft.com/office/drawing/2014/main" id="{F4C15291-8029-47A0-9052-352EEF0A0B3F}"/>
               </a:ext>
             </a:extLst>
           </p:cNvPr>
-          <p:cNvSpPr>
-            <a:spLocks noGrp="1"/>
-          </p:cNvSpPr>
-          <p:nvPr>
-            <p:ph type="title"/>
-          </p:nvPr>
-        </p:nvSpPr>
-        <p:spPr>
-          <a:xfrm>
-            <a:off x="913795" y="0"/>
-            <a:ext cx="10353762" cy="970450"/>
-          </a:xfrm>
-        </p:spPr>
-        <p:txBody>
-          <a:bodyPr>
-            <a:normAutofit/>
-          </a:bodyPr>
-          <a:lstStyle/>
-          <a:p>
-            <a:r>
-              <a:rPr lang="pt-BR" sz="4800" dirty="0"/>
-              <a:t>Objetivos</a:t>
-            </a:r>
-          </a:p>
-        </p:txBody>
-      </p:sp>
-      <p:sp>
-        <p:nvSpPr>
-          <p:cNvPr id="3" name="Espaço Reservado para Conteúdo 2">
+          <p:cNvPicPr>
+            <a:picLocks noChangeAspect="1"/>
+          </p:cNvPicPr>
+          <p:nvPr/>
+        </p:nvPicPr>
+        <p:blipFill>
+          <a:blip r:embed="rId2"/>
+          <a:stretch>
+            <a:fillRect/>
+          </a:stretch>
+        </p:blipFill>
+        <p:spPr>
+          <a:xfrm>
+            <a:off x="1300117" y="791129"/>
+            <a:ext cx="3714750" cy="819150"/>
+          </a:xfrm>
+          <a:prstGeom prst="rect">
+            <a:avLst/>
+          </a:prstGeom>
+        </p:spPr>
+      </p:pic>
+      <p:pic>
+        <p:nvPicPr>
+          <p:cNvPr id="7" name="Imagem 6">
             <a:extLst>
               <a:ext uri="{FF2B5EF4-FFF2-40B4-BE49-F238E27FC236}">
-                <a16:creationId xmlns:a16="http://schemas.microsoft.com/office/drawing/2014/main" id="{E712B0CE-4318-4FB6-B5D9-F34ECD3C1371}"/>
+                <a16:creationId xmlns:a16="http://schemas.microsoft.com/office/drawing/2014/main" id="{065799AF-F54C-44E1-A002-AD9C355CDBE1}"/>
               </a:ext>
             </a:extLst>
           </p:cNvPr>
-          <p:cNvSpPr>
-            <a:spLocks noGrp="1"/>
-          </p:cNvSpPr>
-          <p:nvPr>
-            <p:ph idx="1"/>
-          </p:nvPr>
-        </p:nvSpPr>
-        <p:spPr>
-          <a:xfrm>
-            <a:off x="913795" y="1732449"/>
-            <a:ext cx="10353762" cy="5125551"/>
-          </a:xfrm>
-        </p:spPr>
-        <p:txBody>
-          <a:bodyPr>
-            <a:normAutofit fontScale="92500" lnSpcReduction="10000"/>
-          </a:bodyPr>
-          <a:lstStyle/>
-          <a:p>
-            <a:pPr marL="36900" indent="0" algn="just">
-              <a:buNone/>
-            </a:pPr>
-            <a:r>
-              <a:rPr lang="pt-BR" sz="2400" dirty="0"/>
-              <a:t>	</a:t>
-            </a:r>
-            <a:r>
-              <a:rPr lang="pt-BR" sz="2800" dirty="0"/>
-              <a:t>Desenvolvimento de uma interface gráfica de monitoramento do comportamento das ações e índices da B3, que possua:</a:t>
-            </a:r>
-          </a:p>
-          <a:p>
-            <a:pPr lvl="1" algn="just"/>
-            <a:r>
-              <a:rPr lang="pt-BR" sz="2800" dirty="0"/>
-              <a:t>Gráfico interativo dos valores históricos e </a:t>
-            </a:r>
-            <a:r>
-              <a:rPr lang="pt-BR" sz="2800" dirty="0" err="1"/>
-              <a:t>intraday</a:t>
-            </a:r>
-            <a:r>
-              <a:rPr lang="pt-BR" sz="2800" dirty="0"/>
-              <a:t> das ações;</a:t>
-            </a:r>
-          </a:p>
-          <a:p>
-            <a:pPr lvl="1" algn="just"/>
-            <a:r>
-              <a:rPr lang="pt-BR" sz="2800" dirty="0"/>
-              <a:t>Gráfico interativo dos valores históricos e </a:t>
-            </a:r>
-            <a:r>
-              <a:rPr lang="pt-BR" sz="2800" dirty="0" err="1"/>
-              <a:t>intraday</a:t>
-            </a:r>
-            <a:r>
-              <a:rPr lang="pt-BR" sz="2800" dirty="0"/>
-              <a:t> dos índices;</a:t>
-            </a:r>
-          </a:p>
-          <a:p>
-            <a:pPr lvl="1" algn="just"/>
-            <a:r>
-              <a:rPr lang="pt-BR" sz="2800" dirty="0"/>
-              <a:t>Valores das principais ações em tempo real;</a:t>
-            </a:r>
-          </a:p>
-          <a:p>
-            <a:pPr lvl="1" algn="just"/>
-            <a:r>
-              <a:rPr lang="pt-BR" sz="2800" dirty="0"/>
-              <a:t>Campos para o usuário escolher o índice ou ação desejada;</a:t>
-            </a:r>
-          </a:p>
-          <a:p>
-            <a:pPr lvl="1" algn="just"/>
-            <a:r>
-              <a:rPr lang="pt-BR" sz="2800" dirty="0"/>
-              <a:t>Principais indicadores das ações;</a:t>
-            </a:r>
-          </a:p>
-          <a:p>
-            <a:pPr lvl="1" algn="just"/>
-            <a:r>
-              <a:rPr lang="pt-BR" sz="2800" dirty="0"/>
-              <a:t>Valor de previsão de fechamento de ação para o pregão do dia, com uso de algum modelo de aprendizado de máquina.</a:t>
-            </a:r>
-          </a:p>
-          <a:p>
-            <a:pPr lvl="1" algn="just"/>
-            <a:endParaRPr lang="pt-BR" sz="2400" dirty="0"/>
-          </a:p>
-          <a:p>
-            <a:pPr marL="450000" lvl="1" indent="0" algn="just">
-              <a:buNone/>
-            </a:pPr>
-            <a:r>
-              <a:rPr lang="pt-BR" dirty="0"/>
-              <a:t>	</a:t>
-            </a:r>
-          </a:p>
-        </p:txBody>
-      </p:sp>
+          <p:cNvPicPr>
+            <a:picLocks noChangeAspect="1"/>
+          </p:cNvPicPr>
+          <p:nvPr/>
+        </p:nvPicPr>
+        <p:blipFill>
+          <a:blip r:embed="rId3"/>
+          <a:stretch>
+            <a:fillRect/>
+          </a:stretch>
+        </p:blipFill>
+        <p:spPr>
+          <a:xfrm>
+            <a:off x="7372444" y="791129"/>
+            <a:ext cx="2210405" cy="819150"/>
+          </a:xfrm>
+          <a:prstGeom prst="rect">
+            <a:avLst/>
+          </a:prstGeom>
+        </p:spPr>
+      </p:pic>
+      <p:pic>
+        <p:nvPicPr>
+          <p:cNvPr id="9" name="Imagem 8">
+            <a:extLst>
+              <a:ext uri="{FF2B5EF4-FFF2-40B4-BE49-F238E27FC236}">
+                <a16:creationId xmlns:a16="http://schemas.microsoft.com/office/drawing/2014/main" id="{BBB89CD6-7813-49E5-81C1-FECCA701972C}"/>
+              </a:ext>
+            </a:extLst>
+          </p:cNvPr>
+          <p:cNvPicPr>
+            <a:picLocks noChangeAspect="1"/>
+          </p:cNvPicPr>
+          <p:nvPr/>
+        </p:nvPicPr>
+        <p:blipFill>
+          <a:blip r:embed="rId4"/>
+          <a:stretch>
+            <a:fillRect/>
+          </a:stretch>
+        </p:blipFill>
+        <p:spPr>
+          <a:xfrm>
+            <a:off x="1300117" y="3550997"/>
+            <a:ext cx="3714750" cy="804059"/>
+          </a:xfrm>
+          <a:prstGeom prst="rect">
+            <a:avLst/>
+          </a:prstGeom>
+        </p:spPr>
+      </p:pic>
+      <p:pic>
+        <p:nvPicPr>
+          <p:cNvPr id="11" name="Imagem 10">
+            <a:extLst>
+              <a:ext uri="{FF2B5EF4-FFF2-40B4-BE49-F238E27FC236}">
+                <a16:creationId xmlns:a16="http://schemas.microsoft.com/office/drawing/2014/main" id="{A05D0A03-1EA8-43E7-989C-8BBBCC2C2A29}"/>
+              </a:ext>
+            </a:extLst>
+          </p:cNvPr>
+          <p:cNvPicPr>
+            <a:picLocks noChangeAspect="1"/>
+          </p:cNvPicPr>
+          <p:nvPr/>
+        </p:nvPicPr>
+        <p:blipFill>
+          <a:blip r:embed="rId5"/>
+          <a:stretch>
+            <a:fillRect/>
+          </a:stretch>
+        </p:blipFill>
+        <p:spPr>
+          <a:xfrm>
+            <a:off x="7372444" y="3281889"/>
+            <a:ext cx="2210404" cy="1073167"/>
+          </a:xfrm>
+          <a:prstGeom prst="rect">
+            <a:avLst/>
+          </a:prstGeom>
+        </p:spPr>
+      </p:pic>
     </p:spTree>
     <p:extLst>
       <p:ext uri="{BB962C8B-B14F-4D97-AF65-F5344CB8AC3E}">
-        <p14:creationId xmlns:p14="http://schemas.microsoft.com/office/powerpoint/2010/main" val="2758573977"/>
+        <p14:creationId xmlns:p14="http://schemas.microsoft.com/office/powerpoint/2010/main" val="1991107527"/>
       </p:ext>
     </p:extLst>
   </p:cSld>
@@ -7435,10 +7524,45 @@
       </p:grpSpPr>
       <p:sp>
         <p:nvSpPr>
+          <p:cNvPr id="2" name="Título 1">
+            <a:extLst>
+              <a:ext uri="{FF2B5EF4-FFF2-40B4-BE49-F238E27FC236}">
+                <a16:creationId xmlns:a16="http://schemas.microsoft.com/office/drawing/2014/main" id="{388AB3D3-2612-4007-923D-42D212144C15}"/>
+              </a:ext>
+            </a:extLst>
+          </p:cNvPr>
+          <p:cNvSpPr>
+            <a:spLocks noGrp="1"/>
+          </p:cNvSpPr>
+          <p:nvPr>
+            <p:ph type="title"/>
+          </p:nvPr>
+        </p:nvSpPr>
+        <p:spPr>
+          <a:xfrm>
+            <a:off x="913795" y="0"/>
+            <a:ext cx="10353762" cy="970450"/>
+          </a:xfrm>
+        </p:spPr>
+        <p:txBody>
+          <a:bodyPr>
+            <a:normAutofit/>
+          </a:bodyPr>
+          <a:lstStyle/>
+          <a:p>
+            <a:r>
+              <a:rPr lang="pt-BR" sz="4800" dirty="0"/>
+              <a:t>Objetivos</a:t>
+            </a:r>
+          </a:p>
+        </p:txBody>
+      </p:sp>
+      <p:sp>
+        <p:nvSpPr>
           <p:cNvPr id="3" name="Espaço Reservado para Conteúdo 2">
             <a:extLst>
               <a:ext uri="{FF2B5EF4-FFF2-40B4-BE49-F238E27FC236}">
-                <a16:creationId xmlns:a16="http://schemas.microsoft.com/office/drawing/2014/main" id="{3ED12823-9A0E-4116-B9EF-ACD47855F14D}"/>
+                <a16:creationId xmlns:a16="http://schemas.microsoft.com/office/drawing/2014/main" id="{E712B0CE-4318-4FB6-B5D9-F34ECD3C1371}"/>
               </a:ext>
             </a:extLst>
           </p:cNvPr>
@@ -7449,98 +7573,115 @@
             <p:ph idx="1"/>
           </p:nvPr>
         </p:nvSpPr>
-        <p:spPr/>
-        <p:txBody>
-          <a:bodyPr/>
-          <a:lstStyle/>
-          <a:p>
+        <p:spPr>
+          <a:xfrm>
+            <a:off x="913795" y="1732449"/>
+            <a:ext cx="10353762" cy="5125551"/>
+          </a:xfrm>
+        </p:spPr>
+        <p:txBody>
+          <a:bodyPr>
+            <a:normAutofit fontScale="92500" lnSpcReduction="10000"/>
+          </a:bodyPr>
+          <a:lstStyle/>
+          <a:p>
+            <a:pPr marL="36900" indent="0" algn="just">
+              <a:buNone/>
+            </a:pPr>
             <a:r>
               <a:rPr lang="pt-BR" sz="2400" dirty="0"/>
-              <a:t>Síntese de informações</a:t>
-            </a:r>
-          </a:p>
-          <a:p>
+              <a:t>	</a:t>
+            </a:r>
+            <a:r>
+              <a:rPr lang="pt-BR" sz="2800" dirty="0"/>
+              <a:t>Desenvolvimento de uma interface gráfica de monitoramento do comportamento das ações e índices da B3, que possua:</a:t>
+            </a:r>
+          </a:p>
+          <a:p>
+            <a:pPr lvl="1" algn="just"/>
+            <a:r>
+              <a:rPr lang="pt-BR" sz="2800" dirty="0"/>
+              <a:t>Gráfico interativo dos valores históricos e </a:t>
+            </a:r>
+            <a:r>
+              <a:rPr lang="pt-BR" sz="2800" dirty="0" err="1"/>
+              <a:t>intraday</a:t>
+            </a:r>
+            <a:r>
+              <a:rPr lang="pt-BR" sz="2800" dirty="0"/>
+              <a:t> das ações;</a:t>
+            </a:r>
+          </a:p>
+          <a:p>
+            <a:pPr lvl="1" algn="just"/>
+            <a:r>
+              <a:rPr lang="pt-BR" sz="2800" dirty="0"/>
+              <a:t>Gráfico interativo dos valores históricos e </a:t>
+            </a:r>
+            <a:r>
+              <a:rPr lang="pt-BR" sz="2800" dirty="0" err="1"/>
+              <a:t>intraday</a:t>
+            </a:r>
+            <a:r>
+              <a:rPr lang="pt-BR" sz="2800" dirty="0"/>
+              <a:t> dos índices;</a:t>
+            </a:r>
+          </a:p>
+          <a:p>
+            <a:pPr lvl="1" algn="just"/>
+            <a:r>
+              <a:rPr lang="pt-BR" sz="2800" dirty="0"/>
+              <a:t>Valores das principais ações em tempo real;</a:t>
+            </a:r>
+          </a:p>
+          <a:p>
+            <a:pPr lvl="1" algn="just"/>
+            <a:r>
+              <a:rPr lang="pt-BR" sz="2800" dirty="0"/>
+              <a:t>Campos para o usuário escolher o índice ou ação desejada;</a:t>
+            </a:r>
+          </a:p>
+          <a:p>
+            <a:pPr lvl="1" algn="just"/>
+            <a:r>
+              <a:rPr lang="pt-BR" sz="2800" dirty="0"/>
+              <a:t>Principais indicadores das ações;</a:t>
+            </a:r>
+          </a:p>
+          <a:p>
+            <a:pPr lvl="1" algn="just"/>
+            <a:r>
+              <a:rPr lang="pt-BR" sz="2800" dirty="0"/>
+              <a:t>Valor de previsão de fechamento de ação para o pregão do dia, com uso de algum modelo de </a:t>
+            </a:r>
+            <a:r>
+              <a:rPr lang="pt-BR" sz="2800" dirty="0" err="1"/>
+              <a:t>machine</a:t>
+            </a:r>
+            <a:r>
+              <a:rPr lang="pt-BR" sz="2800" dirty="0"/>
+              <a:t> </a:t>
+            </a:r>
+            <a:r>
+              <a:rPr lang="pt-BR" sz="2800" dirty="0" err="1"/>
+              <a:t>learning</a:t>
+            </a:r>
+            <a:r>
+              <a:rPr lang="pt-BR" sz="2800" dirty="0"/>
+              <a:t>.</a:t>
+            </a:r>
+          </a:p>
+          <a:p>
+            <a:pPr lvl="1" algn="just"/>
             <a:endParaRPr lang="pt-BR" sz="2400" dirty="0"/>
           </a:p>
           <a:p>
-            <a:r>
-              <a:rPr lang="pt-BR" sz="2400" dirty="0"/>
-              <a:t>Utilização simples e intuitiva</a:t>
-            </a:r>
-          </a:p>
-          <a:p>
-            <a:endParaRPr lang="pt-BR" sz="2400" dirty="0"/>
-          </a:p>
-          <a:p>
-            <a:r>
-              <a:rPr lang="pt-BR" sz="2400" dirty="0"/>
-              <a:t>Emprego de </a:t>
-            </a:r>
-            <a:r>
-              <a:rPr lang="pt-BR" sz="2400" dirty="0" err="1"/>
-              <a:t>machine</a:t>
-            </a:r>
-            <a:r>
-              <a:rPr lang="pt-BR" sz="2400" dirty="0"/>
-              <a:t> </a:t>
-            </a:r>
-            <a:r>
-              <a:rPr lang="pt-BR" sz="2400" dirty="0" err="1"/>
-              <a:t>learning</a:t>
-            </a:r>
-            <a:endParaRPr lang="pt-BR" sz="2400" dirty="0"/>
-          </a:p>
-          <a:p>
-            <a:pPr marL="36900" indent="0">
+            <a:pPr marL="450000" lvl="1" indent="0" algn="just">
               <a:buNone/>
             </a:pPr>
-            <a:endParaRPr lang="pt-BR" dirty="0"/>
-          </a:p>
-          <a:p>
-            <a:pPr marL="36900" indent="0">
-              <a:buNone/>
-            </a:pPr>
-            <a:endParaRPr lang="pt-BR" dirty="0"/>
-          </a:p>
-          <a:p>
-            <a:pPr marL="36900" indent="0">
-              <a:buNone/>
-            </a:pPr>
-            <a:endParaRPr lang="pt-BR" dirty="0"/>
-          </a:p>
-        </p:txBody>
-      </p:sp>
-      <p:sp>
-        <p:nvSpPr>
-          <p:cNvPr id="4" name="Título 1">
-            <a:extLst>
-              <a:ext uri="{FF2B5EF4-FFF2-40B4-BE49-F238E27FC236}">
-                <a16:creationId xmlns:a16="http://schemas.microsoft.com/office/drawing/2014/main" id="{4A16C52F-D4D4-495F-99D3-70F3E9D2F858}"/>
-              </a:ext>
-            </a:extLst>
-          </p:cNvPr>
-          <p:cNvSpPr>
-            <a:spLocks noGrp="1"/>
-          </p:cNvSpPr>
-          <p:nvPr>
-            <p:ph type="title"/>
-          </p:nvPr>
-        </p:nvSpPr>
-        <p:spPr>
-          <a:xfrm>
-            <a:off x="913795" y="0"/>
-            <a:ext cx="10353762" cy="970450"/>
-          </a:xfrm>
-        </p:spPr>
-        <p:txBody>
-          <a:bodyPr>
-            <a:normAutofit/>
-          </a:bodyPr>
-          <a:lstStyle/>
-          <a:p>
-            <a:r>
-              <a:rPr lang="pt-BR" sz="4800" dirty="0"/>
-              <a:t>Justificativa</a:t>
+            <a:r>
+              <a:rPr lang="pt-BR" dirty="0"/>
+              <a:t>	</a:t>
             </a:r>
           </a:p>
         </p:txBody>
@@ -7548,7 +7689,7 @@
     </p:spTree>
     <p:extLst>
       <p:ext uri="{BB962C8B-B14F-4D97-AF65-F5344CB8AC3E}">
-        <p14:creationId xmlns:p14="http://schemas.microsoft.com/office/powerpoint/2010/main" val="3961222925"/>
+        <p14:creationId xmlns:p14="http://schemas.microsoft.com/office/powerpoint/2010/main" val="2758573977"/>
       </p:ext>
     </p:extLst>
   </p:cSld>
@@ -7577,10 +7718,10 @@
       </p:grpSpPr>
       <p:sp>
         <p:nvSpPr>
-          <p:cNvPr id="2" name="Título 1">
+          <p:cNvPr id="3" name="Espaço Reservado para Conteúdo 2">
             <a:extLst>
               <a:ext uri="{FF2B5EF4-FFF2-40B4-BE49-F238E27FC236}">
-                <a16:creationId xmlns:a16="http://schemas.microsoft.com/office/drawing/2014/main" id="{871AADA7-07C8-42C9-8105-C43CCBB139A3}"/>
+                <a16:creationId xmlns:a16="http://schemas.microsoft.com/office/drawing/2014/main" id="{3ED12823-9A0E-4116-B9EF-ACD47855F14D}"/>
               </a:ext>
             </a:extLst>
           </p:cNvPr>
@@ -7588,6 +7729,83 @@
             <a:spLocks noGrp="1"/>
           </p:cNvSpPr>
           <p:nvPr>
+            <p:ph idx="1"/>
+          </p:nvPr>
+        </p:nvSpPr>
+        <p:spPr/>
+        <p:txBody>
+          <a:bodyPr/>
+          <a:lstStyle/>
+          <a:p>
+            <a:r>
+              <a:rPr lang="pt-BR" sz="2400" dirty="0"/>
+              <a:t>Síntese de informações</a:t>
+            </a:r>
+          </a:p>
+          <a:p>
+            <a:endParaRPr lang="pt-BR" sz="2400" dirty="0"/>
+          </a:p>
+          <a:p>
+            <a:r>
+              <a:rPr lang="pt-BR" sz="2400" dirty="0"/>
+              <a:t>Utilização simples e intuitiva, sem sistema de cadastro</a:t>
+            </a:r>
+          </a:p>
+          <a:p>
+            <a:endParaRPr lang="pt-BR" sz="2400" dirty="0"/>
+          </a:p>
+          <a:p>
+            <a:r>
+              <a:rPr lang="pt-BR" sz="2400" dirty="0"/>
+              <a:t>Emprego de </a:t>
+            </a:r>
+            <a:r>
+              <a:rPr lang="pt-BR" sz="2400" dirty="0" err="1"/>
+              <a:t>machine</a:t>
+            </a:r>
+            <a:r>
+              <a:rPr lang="pt-BR" sz="2400" dirty="0"/>
+              <a:t> </a:t>
+            </a:r>
+            <a:r>
+              <a:rPr lang="pt-BR" sz="2400" dirty="0" err="1"/>
+              <a:t>learning</a:t>
+            </a:r>
+            <a:endParaRPr lang="pt-BR" sz="2400" dirty="0"/>
+          </a:p>
+          <a:p>
+            <a:pPr marL="36900" indent="0">
+              <a:buNone/>
+            </a:pPr>
+            <a:endParaRPr lang="pt-BR" dirty="0"/>
+          </a:p>
+          <a:p>
+            <a:pPr marL="36900" indent="0">
+              <a:buNone/>
+            </a:pPr>
+            <a:endParaRPr lang="pt-BR" dirty="0"/>
+          </a:p>
+          <a:p>
+            <a:pPr marL="36900" indent="0">
+              <a:buNone/>
+            </a:pPr>
+            <a:endParaRPr lang="pt-BR" dirty="0"/>
+          </a:p>
+        </p:txBody>
+      </p:sp>
+      <p:sp>
+        <p:nvSpPr>
+          <p:cNvPr id="4" name="Título 1">
+            <a:extLst>
+              <a:ext uri="{FF2B5EF4-FFF2-40B4-BE49-F238E27FC236}">
+                <a16:creationId xmlns:a16="http://schemas.microsoft.com/office/drawing/2014/main" id="{4A16C52F-D4D4-495F-99D3-70F3E9D2F858}"/>
+              </a:ext>
+            </a:extLst>
+          </p:cNvPr>
+          <p:cNvSpPr>
+            <a:spLocks noGrp="1"/>
+          </p:cNvSpPr>
+          <p:nvPr>
             <p:ph type="title"/>
           </p:nvPr>
         </p:nvSpPr>
@@ -7605,93 +7823,15 @@
           <a:p>
             <a:r>
               <a:rPr lang="pt-BR" sz="4800" dirty="0"/>
-              <a:t>Ferramentas e Tecnologias</a:t>
-            </a:r>
-          </a:p>
-        </p:txBody>
-      </p:sp>
-      <p:sp>
-        <p:nvSpPr>
-          <p:cNvPr id="3" name="Espaço Reservado para Conteúdo 2">
-            <a:extLst>
-              <a:ext uri="{FF2B5EF4-FFF2-40B4-BE49-F238E27FC236}">
-                <a16:creationId xmlns:a16="http://schemas.microsoft.com/office/drawing/2014/main" id="{1FEC3204-ED9D-4A80-80A8-FC37FF7C9026}"/>
-              </a:ext>
-            </a:extLst>
-          </p:cNvPr>
-          <p:cNvSpPr>
-            <a:spLocks noGrp="1"/>
-          </p:cNvSpPr>
-          <p:nvPr>
-            <p:ph idx="1"/>
-          </p:nvPr>
-        </p:nvSpPr>
-        <p:spPr/>
-        <p:txBody>
-          <a:bodyPr>
-            <a:normAutofit lnSpcReduction="10000"/>
-          </a:bodyPr>
-          <a:lstStyle/>
-          <a:p>
-            <a:r>
-              <a:rPr lang="pt-BR" sz="2400" dirty="0"/>
-              <a:t>Django</a:t>
-            </a:r>
-          </a:p>
-          <a:p>
-            <a:r>
-              <a:rPr lang="pt-BR" sz="2400" dirty="0"/>
-              <a:t>HTML, CSS e JS</a:t>
-            </a:r>
-          </a:p>
-          <a:p>
-            <a:r>
-              <a:rPr lang="pt-BR" sz="2400" dirty="0" err="1"/>
-              <a:t>jQuery</a:t>
-            </a:r>
-            <a:endParaRPr lang="pt-BR" sz="2400" dirty="0"/>
-          </a:p>
-          <a:p>
-            <a:r>
-              <a:rPr lang="pt-BR" sz="2400" dirty="0"/>
-              <a:t>ApexChart.js</a:t>
-            </a:r>
-          </a:p>
-          <a:p>
-            <a:r>
-              <a:rPr lang="pt-BR" sz="2400" dirty="0"/>
-              <a:t>MySQL</a:t>
-            </a:r>
-          </a:p>
-          <a:p>
-            <a:r>
-              <a:rPr lang="pt-BR" sz="2400" dirty="0"/>
-              <a:t>Python</a:t>
-            </a:r>
-          </a:p>
-          <a:p>
-            <a:r>
-              <a:rPr lang="pt-BR" sz="2400" dirty="0" err="1"/>
-              <a:t>yfinance</a:t>
-            </a:r>
-            <a:endParaRPr lang="pt-BR" sz="2400" dirty="0"/>
-          </a:p>
-          <a:p>
-            <a:r>
-              <a:rPr lang="pt-BR" sz="2400" dirty="0" err="1"/>
-              <a:t>scikit-learn</a:t>
-            </a:r>
-            <a:endParaRPr lang="pt-BR" sz="2400" dirty="0"/>
-          </a:p>
-          <a:p>
-            <a:endParaRPr lang="pt-BR" dirty="0"/>
+              <a:t>Justificativa</a:t>
+            </a:r>
           </a:p>
         </p:txBody>
       </p:sp>
     </p:spTree>
     <p:extLst>
       <p:ext uri="{BB962C8B-B14F-4D97-AF65-F5344CB8AC3E}">
-        <p14:creationId xmlns:p14="http://schemas.microsoft.com/office/powerpoint/2010/main" val="1418626836"/>
+        <p14:creationId xmlns:p14="http://schemas.microsoft.com/office/powerpoint/2010/main" val="3961222925"/>
       </p:ext>
     </p:extLst>
   </p:cSld>
@@ -7723,6 +7863,143 @@
           <p:cNvPr id="2" name="Título 1">
             <a:extLst>
               <a:ext uri="{FF2B5EF4-FFF2-40B4-BE49-F238E27FC236}">
+                <a16:creationId xmlns:a16="http://schemas.microsoft.com/office/drawing/2014/main" id="{871AADA7-07C8-42C9-8105-C43CCBB139A3}"/>
+              </a:ext>
+            </a:extLst>
+          </p:cNvPr>
+          <p:cNvSpPr>
+            <a:spLocks noGrp="1"/>
+          </p:cNvSpPr>
+          <p:nvPr>
+            <p:ph type="title"/>
+          </p:nvPr>
+        </p:nvSpPr>
+        <p:spPr>
+          <a:xfrm>
+            <a:off x="913795" y="0"/>
+            <a:ext cx="10353762" cy="970450"/>
+          </a:xfrm>
+        </p:spPr>
+        <p:txBody>
+          <a:bodyPr>
+            <a:normAutofit/>
+          </a:bodyPr>
+          <a:lstStyle/>
+          <a:p>
+            <a:r>
+              <a:rPr lang="pt-BR" sz="4800" dirty="0"/>
+              <a:t>Ferramentas e Tecnologias</a:t>
+            </a:r>
+          </a:p>
+        </p:txBody>
+      </p:sp>
+      <p:sp>
+        <p:nvSpPr>
+          <p:cNvPr id="3" name="Espaço Reservado para Conteúdo 2">
+            <a:extLst>
+              <a:ext uri="{FF2B5EF4-FFF2-40B4-BE49-F238E27FC236}">
+                <a16:creationId xmlns:a16="http://schemas.microsoft.com/office/drawing/2014/main" id="{1FEC3204-ED9D-4A80-80A8-FC37FF7C9026}"/>
+              </a:ext>
+            </a:extLst>
+          </p:cNvPr>
+          <p:cNvSpPr>
+            <a:spLocks noGrp="1"/>
+          </p:cNvSpPr>
+          <p:nvPr>
+            <p:ph idx="1"/>
+          </p:nvPr>
+        </p:nvSpPr>
+        <p:spPr/>
+        <p:txBody>
+          <a:bodyPr>
+            <a:normAutofit/>
+          </a:bodyPr>
+          <a:lstStyle/>
+          <a:p>
+            <a:r>
+              <a:rPr lang="pt-BR" sz="2400" dirty="0"/>
+              <a:t>Django</a:t>
+            </a:r>
+          </a:p>
+          <a:p>
+            <a:r>
+              <a:rPr lang="pt-BR" sz="2400" dirty="0"/>
+              <a:t>HTML, CSS e JS</a:t>
+            </a:r>
+          </a:p>
+          <a:p>
+            <a:r>
+              <a:rPr lang="pt-BR" sz="2400" dirty="0" err="1"/>
+              <a:t>jQuery</a:t>
+            </a:r>
+            <a:endParaRPr lang="pt-BR" sz="2400" dirty="0"/>
+          </a:p>
+          <a:p>
+            <a:r>
+              <a:rPr lang="pt-BR" sz="2400" dirty="0"/>
+              <a:t>ApexChart.js</a:t>
+            </a:r>
+          </a:p>
+          <a:p>
+            <a:r>
+              <a:rPr lang="pt-BR" sz="2400" dirty="0"/>
+              <a:t>MySQL</a:t>
+            </a:r>
+          </a:p>
+          <a:p>
+            <a:r>
+              <a:rPr lang="pt-BR" sz="2400" dirty="0" err="1"/>
+              <a:t>yfinance</a:t>
+            </a:r>
+            <a:endParaRPr lang="pt-BR" sz="2400" dirty="0"/>
+          </a:p>
+          <a:p>
+            <a:r>
+              <a:rPr lang="pt-BR" sz="2400" dirty="0" err="1"/>
+              <a:t>scikit-learn</a:t>
+            </a:r>
+            <a:endParaRPr lang="pt-BR" sz="2400" dirty="0"/>
+          </a:p>
+          <a:p>
+            <a:endParaRPr lang="pt-BR" dirty="0"/>
+          </a:p>
+        </p:txBody>
+      </p:sp>
+    </p:spTree>
+    <p:extLst>
+      <p:ext uri="{BB962C8B-B14F-4D97-AF65-F5344CB8AC3E}">
+        <p14:creationId xmlns:p14="http://schemas.microsoft.com/office/powerpoint/2010/main" val="1418626836"/>
+      </p:ext>
+    </p:extLst>
+  </p:cSld>
+  <p:clrMapOvr>
+    <a:masterClrMapping/>
+  </p:clrMapOvr>
+</p:sld>
+</file>
+
+<file path=ppt/slides/slide7.xml><?xml version="1.0" encoding="utf-8"?>
+<p:sld xmlns:a="http://schemas.openxmlformats.org/drawingml/2006/main" xmlns:r="http://schemas.openxmlformats.org/officeDocument/2006/relationships" xmlns:p="http://schemas.openxmlformats.org/presentationml/2006/main">
+  <p:cSld>
+    <p:spTree>
+      <p:nvGrpSpPr>
+        <p:cNvPr id="1" name=""/>
+        <p:cNvGrpSpPr/>
+        <p:nvPr/>
+      </p:nvGrpSpPr>
+      <p:grpSpPr>
+        <a:xfrm>
+          <a:off x="0" y="0"/>
+          <a:ext cx="0" cy="0"/>
+          <a:chOff x="0" y="0"/>
+          <a:chExt cx="0" cy="0"/>
+        </a:xfrm>
+      </p:grpSpPr>
+      <p:sp>
+        <p:nvSpPr>
+          <p:cNvPr id="2" name="Título 1">
+            <a:extLst>
+              <a:ext uri="{FF2B5EF4-FFF2-40B4-BE49-F238E27FC236}">
                 <a16:creationId xmlns:a16="http://schemas.microsoft.com/office/drawing/2014/main" id="{471035D7-B0B7-489B-804E-7F59F9413D3D}"/>
               </a:ext>
             </a:extLst>
@@ -7802,187 +8079,6 @@
 </p:sld>
 </file>
 
-<file path=ppt/slides/slide7.xml><?xml version="1.0" encoding="utf-8"?>
-<p:sld xmlns:a="http://schemas.openxmlformats.org/drawingml/2006/main" xmlns:r="http://schemas.openxmlformats.org/officeDocument/2006/relationships" xmlns:p="http://schemas.openxmlformats.org/presentationml/2006/main">
-  <p:cSld>
-    <p:spTree>
-      <p:nvGrpSpPr>
-        <p:cNvPr id="1" name=""/>
-        <p:cNvGrpSpPr/>
-        <p:nvPr/>
-      </p:nvGrpSpPr>
-      <p:grpSpPr>
-        <a:xfrm>
-          <a:off x="0" y="0"/>
-          <a:ext cx="0" cy="0"/>
-          <a:chOff x="0" y="0"/>
-          <a:chExt cx="0" cy="0"/>
-        </a:xfrm>
-      </p:grpSpPr>
-      <p:sp>
-        <p:nvSpPr>
-          <p:cNvPr id="3" name="Espaço Reservado para Conteúdo 2">
-            <a:extLst>
-              <a:ext uri="{FF2B5EF4-FFF2-40B4-BE49-F238E27FC236}">
-                <a16:creationId xmlns:a16="http://schemas.microsoft.com/office/drawing/2014/main" id="{5D7D9DC5-42FF-446D-A761-EC8F5A89EE5C}"/>
-              </a:ext>
-            </a:extLst>
-          </p:cNvPr>
-          <p:cNvSpPr>
-            <a:spLocks noGrp="1"/>
-          </p:cNvSpPr>
-          <p:nvPr>
-            <p:ph idx="1"/>
-          </p:nvPr>
-        </p:nvSpPr>
-        <p:spPr/>
-        <p:txBody>
-          <a:bodyPr>
-            <a:normAutofit/>
-          </a:bodyPr>
-          <a:lstStyle/>
-          <a:p>
-            <a:pPr>
-              <a:lnSpc>
-                <a:spcPct val="150000"/>
-              </a:lnSpc>
-            </a:pPr>
-            <a:r>
-              <a:rPr lang="pt-BR" sz="2400" dirty="0"/>
-              <a:t>Tabelas empresa, </a:t>
-            </a:r>
-            <a:r>
-              <a:rPr lang="pt-BR" sz="2400" dirty="0" err="1"/>
-              <a:t>acao</a:t>
-            </a:r>
-            <a:r>
-              <a:rPr lang="pt-BR" sz="2400" dirty="0"/>
-              <a:t>, </a:t>
-            </a:r>
-            <a:r>
-              <a:rPr lang="pt-BR" sz="2400" dirty="0" err="1"/>
-              <a:t>indice</a:t>
-            </a:r>
-            <a:r>
-              <a:rPr lang="pt-BR" sz="2400" dirty="0"/>
-              <a:t> e listagem populadas com dados retirados da B3</a:t>
-            </a:r>
-          </a:p>
-          <a:p>
-            <a:pPr>
-              <a:lnSpc>
-                <a:spcPct val="150000"/>
-              </a:lnSpc>
-            </a:pPr>
-            <a:r>
-              <a:rPr lang="pt-BR" sz="2400" dirty="0"/>
-              <a:t>Arquivos no formado CSV e planilhas</a:t>
-            </a:r>
-          </a:p>
-          <a:p>
-            <a:pPr>
-              <a:lnSpc>
-                <a:spcPct val="150000"/>
-              </a:lnSpc>
-            </a:pPr>
-            <a:r>
-              <a:rPr lang="pt-BR" sz="2400" dirty="0"/>
-              <a:t>Trabalho de manipulação e limpeza</a:t>
-            </a:r>
-          </a:p>
-          <a:p>
-            <a:pPr>
-              <a:lnSpc>
-                <a:spcPct val="150000"/>
-              </a:lnSpc>
-            </a:pPr>
-            <a:r>
-              <a:rPr lang="pt-BR" sz="2400" dirty="0"/>
-              <a:t>Tabelas </a:t>
-            </a:r>
-            <a:r>
-              <a:rPr lang="pt-BR" sz="2400" dirty="0" err="1"/>
-              <a:t>cotacao</a:t>
-            </a:r>
-            <a:r>
-              <a:rPr lang="pt-BR" sz="2400" dirty="0"/>
-              <a:t> e </a:t>
-            </a:r>
-            <a:r>
-              <a:rPr lang="pt-BR" sz="2400" dirty="0" err="1"/>
-              <a:t>cotacao_índice</a:t>
-            </a:r>
-            <a:r>
-              <a:rPr lang="pt-BR" sz="2400" dirty="0"/>
-              <a:t> populadas com dados da </a:t>
-            </a:r>
-            <a:r>
-              <a:rPr lang="pt-BR" sz="2400" dirty="0" err="1"/>
-              <a:t>yfinance</a:t>
-            </a:r>
-            <a:endParaRPr lang="pt-BR" sz="2400" dirty="0"/>
-          </a:p>
-          <a:p>
-            <a:pPr>
-              <a:lnSpc>
-                <a:spcPct val="150000"/>
-              </a:lnSpc>
-            </a:pPr>
-            <a:r>
-              <a:rPr lang="pt-BR" sz="2400" dirty="0"/>
-              <a:t>Apenas dados históricos</a:t>
-            </a:r>
-          </a:p>
-        </p:txBody>
-      </p:sp>
-      <p:sp>
-        <p:nvSpPr>
-          <p:cNvPr id="4" name="Título 1">
-            <a:extLst>
-              <a:ext uri="{FF2B5EF4-FFF2-40B4-BE49-F238E27FC236}">
-                <a16:creationId xmlns:a16="http://schemas.microsoft.com/office/drawing/2014/main" id="{43E2C49D-33F2-4BDF-9AC4-9EE2A8D76B95}"/>
-              </a:ext>
-            </a:extLst>
-          </p:cNvPr>
-          <p:cNvSpPr>
-            <a:spLocks noGrp="1"/>
-          </p:cNvSpPr>
-          <p:nvPr>
-            <p:ph type="title"/>
-          </p:nvPr>
-        </p:nvSpPr>
-        <p:spPr>
-          <a:xfrm>
-            <a:off x="913795" y="0"/>
-            <a:ext cx="10353762" cy="970450"/>
-          </a:xfrm>
-        </p:spPr>
-        <p:txBody>
-          <a:bodyPr>
-            <a:normAutofit/>
-          </a:bodyPr>
-          <a:lstStyle/>
-          <a:p>
-            <a:r>
-              <a:rPr lang="pt-BR" sz="4800" dirty="0"/>
-              <a:t>Dados iniciais</a:t>
-            </a:r>
-          </a:p>
-        </p:txBody>
-      </p:sp>
-    </p:spTree>
-    <p:extLst>
-      <p:ext uri="{BB962C8B-B14F-4D97-AF65-F5344CB8AC3E}">
-        <p14:creationId xmlns:p14="http://schemas.microsoft.com/office/powerpoint/2010/main" val="554814976"/>
-      </p:ext>
-    </p:extLst>
-  </p:cSld>
-  <p:clrMapOvr>
-    <a:masterClrMapping/>
-  </p:clrMapOvr>
-</p:sld>
-</file>
-
 <file path=ppt/slides/slide8.xml><?xml version="1.0" encoding="utf-8"?>
 <p:sld xmlns:a="http://schemas.openxmlformats.org/drawingml/2006/main" xmlns:r="http://schemas.openxmlformats.org/officeDocument/2006/relationships" xmlns:p="http://schemas.openxmlformats.org/presentationml/2006/main">
   <p:cSld>
@@ -8002,10 +8098,10 @@
       </p:grpSpPr>
       <p:sp>
         <p:nvSpPr>
-          <p:cNvPr id="2" name="Título 1">
+          <p:cNvPr id="3" name="Espaço Reservado para Conteúdo 2">
             <a:extLst>
               <a:ext uri="{FF2B5EF4-FFF2-40B4-BE49-F238E27FC236}">
-                <a16:creationId xmlns:a16="http://schemas.microsoft.com/office/drawing/2014/main" id="{BA0D8160-A975-4153-9339-2D53756B4CBE}"/>
+                <a16:creationId xmlns:a16="http://schemas.microsoft.com/office/drawing/2014/main" id="{5D7D9DC5-42FF-446D-A761-EC8F5A89EE5C}"/>
               </a:ext>
             </a:extLst>
           </p:cNvPr>
@@ -8013,160 +8109,148 @@
             <a:spLocks noGrp="1"/>
           </p:cNvSpPr>
           <p:nvPr>
-            <p:ph type="title"/>
-          </p:nvPr>
-        </p:nvSpPr>
-        <p:spPr>
-          <a:xfrm>
-            <a:off x="913795" y="0"/>
-            <a:ext cx="10353762" cy="970450"/>
-          </a:xfrm>
-        </p:spPr>
+            <p:ph idx="1"/>
+          </p:nvPr>
+        </p:nvSpPr>
+        <p:spPr/>
         <p:txBody>
           <a:bodyPr>
             <a:normAutofit/>
           </a:bodyPr>
           <a:lstStyle/>
           <a:p>
-            <a:r>
-              <a:rPr lang="pt-BR" sz="4800" dirty="0"/>
-              <a:t>Dados </a:t>
-            </a:r>
-            <a:r>
-              <a:rPr lang="pt-BR" sz="4800" dirty="0" err="1"/>
-              <a:t>pré</a:t>
-            </a:r>
-            <a:r>
-              <a:rPr lang="pt-BR" sz="4800" dirty="0"/>
-              <a:t>-inseridos</a:t>
-            </a:r>
-          </a:p>
-        </p:txBody>
-      </p:sp>
-      <p:pic>
-        <p:nvPicPr>
-          <p:cNvPr id="5" name="Imagem 4">
+            <a:pPr>
+              <a:lnSpc>
+                <a:spcPct val="150000"/>
+              </a:lnSpc>
+            </a:pPr>
+            <a:r>
+              <a:rPr lang="pt-BR" sz="2400" dirty="0"/>
+              <a:t>Tabelas empresa, </a:t>
+            </a:r>
+            <a:r>
+              <a:rPr lang="pt-BR" sz="2400" dirty="0" err="1"/>
+              <a:t>acao</a:t>
+            </a:r>
+            <a:r>
+              <a:rPr lang="pt-BR" sz="2400" dirty="0"/>
+              <a:t>, </a:t>
+            </a:r>
+            <a:r>
+              <a:rPr lang="pt-BR" sz="2400" dirty="0" err="1"/>
+              <a:t>indice</a:t>
+            </a:r>
+            <a:r>
+              <a:rPr lang="pt-BR" sz="2400" dirty="0"/>
+              <a:t> e listagem populadas com dados retirados da B3</a:t>
+            </a:r>
+          </a:p>
+          <a:p>
+            <a:pPr>
+              <a:lnSpc>
+                <a:spcPct val="150000"/>
+              </a:lnSpc>
+            </a:pPr>
+            <a:r>
+              <a:rPr lang="pt-BR" sz="2400" dirty="0"/>
+              <a:t>Arquivos no formado CSV e planilhas</a:t>
+            </a:r>
+          </a:p>
+          <a:p>
+            <a:pPr>
+              <a:lnSpc>
+                <a:spcPct val="150000"/>
+              </a:lnSpc>
+            </a:pPr>
+            <a:r>
+              <a:rPr lang="pt-BR" sz="2400" dirty="0"/>
+              <a:t>Trabalho de manipulação e limpeza</a:t>
+            </a:r>
+          </a:p>
+          <a:p>
+            <a:pPr>
+              <a:lnSpc>
+                <a:spcPct val="150000"/>
+              </a:lnSpc>
+            </a:pPr>
+            <a:r>
+              <a:rPr lang="pt-BR" sz="2400" dirty="0"/>
+              <a:t>Tabelas </a:t>
+            </a:r>
+            <a:r>
+              <a:rPr lang="pt-BR" sz="2400" dirty="0" err="1"/>
+              <a:t>cotacao</a:t>
+            </a:r>
+            <a:r>
+              <a:rPr lang="pt-BR" sz="2400" dirty="0"/>
+              <a:t> e </a:t>
+            </a:r>
+            <a:r>
+              <a:rPr lang="pt-BR" sz="2400" dirty="0" err="1"/>
+              <a:t>cotacao_índice</a:t>
+            </a:r>
+            <a:r>
+              <a:rPr lang="pt-BR" sz="2400" dirty="0"/>
+              <a:t> populadas com dados da </a:t>
+            </a:r>
+            <a:r>
+              <a:rPr lang="pt-BR" sz="2400" dirty="0" err="1"/>
+              <a:t>yfinance</a:t>
+            </a:r>
+            <a:endParaRPr lang="pt-BR" sz="2400" dirty="0"/>
+          </a:p>
+          <a:p>
+            <a:pPr>
+              <a:lnSpc>
+                <a:spcPct val="150000"/>
+              </a:lnSpc>
+            </a:pPr>
+            <a:r>
+              <a:rPr lang="pt-BR" sz="2400" dirty="0"/>
+              <a:t>Apenas dados históricos</a:t>
+            </a:r>
+          </a:p>
+        </p:txBody>
+      </p:sp>
+      <p:sp>
+        <p:nvSpPr>
+          <p:cNvPr id="4" name="Título 1">
             <a:extLst>
               <a:ext uri="{FF2B5EF4-FFF2-40B4-BE49-F238E27FC236}">
-                <a16:creationId xmlns:a16="http://schemas.microsoft.com/office/drawing/2014/main" id="{1BFE5266-2175-4E4C-8CB6-2E72A7B74EEF}"/>
+                <a16:creationId xmlns:a16="http://schemas.microsoft.com/office/drawing/2014/main" id="{43E2C49D-33F2-4BDF-9AC4-9EE2A8D76B95}"/>
               </a:ext>
             </a:extLst>
           </p:cNvPr>
-          <p:cNvPicPr>
-            <a:picLocks noChangeAspect="1"/>
-          </p:cNvPicPr>
-          <p:nvPr/>
-        </p:nvPicPr>
-        <p:blipFill>
-          <a:blip r:embed="rId2"/>
-          <a:stretch>
-            <a:fillRect/>
-          </a:stretch>
-        </p:blipFill>
-        <p:spPr>
-          <a:xfrm>
-            <a:off x="924443" y="970449"/>
-            <a:ext cx="2569311" cy="2992244"/>
-          </a:xfrm>
-          <a:prstGeom prst="rect">
-            <a:avLst/>
-          </a:prstGeom>
-        </p:spPr>
-      </p:pic>
-      <p:pic>
-        <p:nvPicPr>
-          <p:cNvPr id="7" name="Imagem 6">
-            <a:extLst>
-              <a:ext uri="{FF2B5EF4-FFF2-40B4-BE49-F238E27FC236}">
-                <a16:creationId xmlns:a16="http://schemas.microsoft.com/office/drawing/2014/main" id="{14B137B6-C6C8-430B-9E71-2C9CBC9B3F50}"/>
-              </a:ext>
-            </a:extLst>
-          </p:cNvPr>
-          <p:cNvPicPr>
-            <a:picLocks noChangeAspect="1"/>
-          </p:cNvPicPr>
-          <p:nvPr/>
-        </p:nvPicPr>
-        <p:blipFill>
-          <a:blip r:embed="rId3"/>
-          <a:stretch>
-            <a:fillRect/>
-          </a:stretch>
-        </p:blipFill>
-        <p:spPr>
-          <a:xfrm>
-            <a:off x="3727971" y="970449"/>
-            <a:ext cx="2483908" cy="2992243"/>
-          </a:xfrm>
-          <a:prstGeom prst="rect">
-            <a:avLst/>
-          </a:prstGeom>
-        </p:spPr>
-      </p:pic>
-      <p:pic>
-        <p:nvPicPr>
-          <p:cNvPr id="9" name="Imagem 8">
-            <a:extLst>
-              <a:ext uri="{FF2B5EF4-FFF2-40B4-BE49-F238E27FC236}">
-                <a16:creationId xmlns:a16="http://schemas.microsoft.com/office/drawing/2014/main" id="{FB1A060C-33BE-4AE7-BB05-7A0CE24B76BA}"/>
-              </a:ext>
-            </a:extLst>
-          </p:cNvPr>
-          <p:cNvPicPr>
-            <a:picLocks noChangeAspect="1"/>
-          </p:cNvPicPr>
-          <p:nvPr/>
-        </p:nvPicPr>
-        <p:blipFill>
-          <a:blip r:embed="rId4"/>
-          <a:stretch>
-            <a:fillRect/>
-          </a:stretch>
-        </p:blipFill>
-        <p:spPr>
-          <a:xfrm>
-            <a:off x="6446096" y="970449"/>
-            <a:ext cx="4821461" cy="2992242"/>
-          </a:xfrm>
-          <a:prstGeom prst="rect">
-            <a:avLst/>
-          </a:prstGeom>
-        </p:spPr>
-      </p:pic>
-      <p:pic>
-        <p:nvPicPr>
-          <p:cNvPr id="11" name="Imagem 10">
-            <a:extLst>
-              <a:ext uri="{FF2B5EF4-FFF2-40B4-BE49-F238E27FC236}">
-                <a16:creationId xmlns:a16="http://schemas.microsoft.com/office/drawing/2014/main" id="{193322F3-0614-44DC-9A7E-6F415E7E3088}"/>
-              </a:ext>
-            </a:extLst>
-          </p:cNvPr>
-          <p:cNvPicPr>
-            <a:picLocks noChangeAspect="1"/>
-          </p:cNvPicPr>
-          <p:nvPr/>
-        </p:nvPicPr>
-        <p:blipFill>
-          <a:blip r:embed="rId5"/>
-          <a:stretch>
-            <a:fillRect/>
-          </a:stretch>
-        </p:blipFill>
-        <p:spPr>
-          <a:xfrm>
-            <a:off x="3950173" y="4100782"/>
-            <a:ext cx="4291654" cy="2705608"/>
-          </a:xfrm>
-          <a:prstGeom prst="rect">
-            <a:avLst/>
-          </a:prstGeom>
-        </p:spPr>
-      </p:pic>
+          <p:cNvSpPr>
+            <a:spLocks noGrp="1"/>
+          </p:cNvSpPr>
+          <p:nvPr>
+            <p:ph type="title"/>
+          </p:nvPr>
+        </p:nvSpPr>
+        <p:spPr>
+          <a:xfrm>
+            <a:off x="913795" y="0"/>
+            <a:ext cx="10353762" cy="970450"/>
+          </a:xfrm>
+        </p:spPr>
+        <p:txBody>
+          <a:bodyPr>
+            <a:normAutofit/>
+          </a:bodyPr>
+          <a:lstStyle/>
+          <a:p>
+            <a:r>
+              <a:rPr lang="pt-BR" sz="4800" dirty="0"/>
+              <a:t>Dados iniciais</a:t>
+            </a:r>
+          </a:p>
+        </p:txBody>
+      </p:sp>
     </p:spTree>
     <p:extLst>
       <p:ext uri="{BB962C8B-B14F-4D97-AF65-F5344CB8AC3E}">
-        <p14:creationId xmlns:p14="http://schemas.microsoft.com/office/powerpoint/2010/main" val="251516426"/>
+        <p14:creationId xmlns:p14="http://schemas.microsoft.com/office/powerpoint/2010/main" val="554814976"/>
       </p:ext>
     </p:extLst>
   </p:cSld>
@@ -8198,7 +8282,7 @@
           <p:cNvPr id="2" name="Título 1">
             <a:extLst>
               <a:ext uri="{FF2B5EF4-FFF2-40B4-BE49-F238E27FC236}">
-                <a16:creationId xmlns:a16="http://schemas.microsoft.com/office/drawing/2014/main" id="{664A4A65-72EC-442E-8632-9ABE2296F788}"/>
+                <a16:creationId xmlns:a16="http://schemas.microsoft.com/office/drawing/2014/main" id="{BA0D8160-A975-4153-9339-2D53756B4CBE}"/>
               </a:ext>
             </a:extLst>
           </p:cNvPr>
@@ -8223,17 +8307,25 @@
           <a:p>
             <a:r>
               <a:rPr lang="pt-BR" sz="4800" dirty="0"/>
-              <a:t>Exemplo de retorno da cotação</a:t>
+              <a:t>Dados </a:t>
+            </a:r>
+            <a:r>
+              <a:rPr lang="pt-BR" sz="4800" dirty="0" err="1"/>
+              <a:t>pré</a:t>
+            </a:r>
+            <a:r>
+              <a:rPr lang="pt-BR" sz="4800" dirty="0"/>
+              <a:t>-inseridos</a:t>
             </a:r>
           </a:p>
         </p:txBody>
       </p:sp>
       <p:pic>
         <p:nvPicPr>
-          <p:cNvPr id="4" name="Imagem 3">
+          <p:cNvPr id="5" name="Imagem 4">
             <a:extLst>
               <a:ext uri="{FF2B5EF4-FFF2-40B4-BE49-F238E27FC236}">
-                <a16:creationId xmlns:a16="http://schemas.microsoft.com/office/drawing/2014/main" id="{184BB44E-800F-4463-9C23-ED88B6ED9B02}"/>
+                <a16:creationId xmlns:a16="http://schemas.microsoft.com/office/drawing/2014/main" id="{1BFE5266-2175-4E4C-8CB6-2E72A7B74EEF}"/>
               </a:ext>
             </a:extLst>
           </p:cNvPr>
@@ -8243,21 +8335,105 @@
           <p:nvPr/>
         </p:nvPicPr>
         <p:blipFill>
-          <a:blip r:embed="rId2">
-            <a:extLst>
-              <a:ext uri="{28A0092B-C50C-407E-A947-70E740481C1C}">
-                <a14:useLocalDpi xmlns:a14="http://schemas.microsoft.com/office/drawing/2010/main" val="0"/>
-              </a:ext>
-            </a:extLst>
-          </a:blip>
+          <a:blip r:embed="rId2"/>
           <a:stretch>
             <a:fillRect/>
           </a:stretch>
         </p:blipFill>
         <p:spPr>
           <a:xfrm>
-            <a:off x="2198657" y="938102"/>
-            <a:ext cx="7784037" cy="5919898"/>
+            <a:off x="924443" y="970449"/>
+            <a:ext cx="2569311" cy="2992244"/>
+          </a:xfrm>
+          <a:prstGeom prst="rect">
+            <a:avLst/>
+          </a:prstGeom>
+        </p:spPr>
+      </p:pic>
+      <p:pic>
+        <p:nvPicPr>
+          <p:cNvPr id="7" name="Imagem 6">
+            <a:extLst>
+              <a:ext uri="{FF2B5EF4-FFF2-40B4-BE49-F238E27FC236}">
+                <a16:creationId xmlns:a16="http://schemas.microsoft.com/office/drawing/2014/main" id="{14B137B6-C6C8-430B-9E71-2C9CBC9B3F50}"/>
+              </a:ext>
+            </a:extLst>
+          </p:cNvPr>
+          <p:cNvPicPr>
+            <a:picLocks noChangeAspect="1"/>
+          </p:cNvPicPr>
+          <p:nvPr/>
+        </p:nvPicPr>
+        <p:blipFill>
+          <a:blip r:embed="rId3"/>
+          <a:stretch>
+            <a:fillRect/>
+          </a:stretch>
+        </p:blipFill>
+        <p:spPr>
+          <a:xfrm>
+            <a:off x="3727971" y="970449"/>
+            <a:ext cx="2483908" cy="2992243"/>
+          </a:xfrm>
+          <a:prstGeom prst="rect">
+            <a:avLst/>
+          </a:prstGeom>
+        </p:spPr>
+      </p:pic>
+      <p:pic>
+        <p:nvPicPr>
+          <p:cNvPr id="9" name="Imagem 8">
+            <a:extLst>
+              <a:ext uri="{FF2B5EF4-FFF2-40B4-BE49-F238E27FC236}">
+                <a16:creationId xmlns:a16="http://schemas.microsoft.com/office/drawing/2014/main" id="{FB1A060C-33BE-4AE7-BB05-7A0CE24B76BA}"/>
+              </a:ext>
+            </a:extLst>
+          </p:cNvPr>
+          <p:cNvPicPr>
+            <a:picLocks noChangeAspect="1"/>
+          </p:cNvPicPr>
+          <p:nvPr/>
+        </p:nvPicPr>
+        <p:blipFill>
+          <a:blip r:embed="rId4"/>
+          <a:stretch>
+            <a:fillRect/>
+          </a:stretch>
+        </p:blipFill>
+        <p:spPr>
+          <a:xfrm>
+            <a:off x="6446096" y="970449"/>
+            <a:ext cx="4821461" cy="2992242"/>
+          </a:xfrm>
+          <a:prstGeom prst="rect">
+            <a:avLst/>
+          </a:prstGeom>
+        </p:spPr>
+      </p:pic>
+      <p:pic>
+        <p:nvPicPr>
+          <p:cNvPr id="11" name="Imagem 10">
+            <a:extLst>
+              <a:ext uri="{FF2B5EF4-FFF2-40B4-BE49-F238E27FC236}">
+                <a16:creationId xmlns:a16="http://schemas.microsoft.com/office/drawing/2014/main" id="{193322F3-0614-44DC-9A7E-6F415E7E3088}"/>
+              </a:ext>
+            </a:extLst>
+          </p:cNvPr>
+          <p:cNvPicPr>
+            <a:picLocks noChangeAspect="1"/>
+          </p:cNvPicPr>
+          <p:nvPr/>
+        </p:nvPicPr>
+        <p:blipFill>
+          <a:blip r:embed="rId5"/>
+          <a:stretch>
+            <a:fillRect/>
+          </a:stretch>
+        </p:blipFill>
+        <p:spPr>
+          <a:xfrm>
+            <a:off x="3950173" y="4100782"/>
+            <a:ext cx="4291654" cy="2705608"/>
           </a:xfrm>
           <a:prstGeom prst="rect">
             <a:avLst/>
@@ -8267,7 +8443,7 @@
     </p:spTree>
     <p:extLst>
       <p:ext uri="{BB962C8B-B14F-4D97-AF65-F5344CB8AC3E}">
-        <p14:creationId xmlns:p14="http://schemas.microsoft.com/office/powerpoint/2010/main" val="1719743760"/>
+        <p14:creationId xmlns:p14="http://schemas.microsoft.com/office/powerpoint/2010/main" val="251516426"/>
       </p:ext>
     </p:extLst>
   </p:cSld>

</xml_diff>

<commit_message>
Correção slides de ultima hora
</commit_message>
<xml_diff>
--- a/documentos/apresentacao_final.pptx
+++ b/documentos/apresentacao_final.pptx
@@ -20,8 +20,10 @@
     <p:sldId id="271" r:id="rId14"/>
     <p:sldId id="265" r:id="rId15"/>
     <p:sldId id="266" r:id="rId16"/>
-    <p:sldId id="272" r:id="rId17"/>
-    <p:sldId id="273" r:id="rId18"/>
+    <p:sldId id="275" r:id="rId17"/>
+    <p:sldId id="276" r:id="rId18"/>
+    <p:sldId id="272" r:id="rId19"/>
+    <p:sldId id="273" r:id="rId20"/>
   </p:sldIdLst>
   <p:sldSz cx="12192000" cy="6858000"/>
   <p:notesSz cx="6858000" cy="9144000"/>
@@ -6957,6 +6959,138 @@
           <a:chExt cx="0" cy="0"/>
         </a:xfrm>
       </p:grpSpPr>
+      <p:pic>
+        <p:nvPicPr>
+          <p:cNvPr id="3" name="Imagem 2">
+            <a:extLst>
+              <a:ext uri="{FF2B5EF4-FFF2-40B4-BE49-F238E27FC236}">
+                <a16:creationId xmlns:a16="http://schemas.microsoft.com/office/drawing/2014/main" id="{037DA567-8449-45B5-AB8D-F7F137B0A0E0}"/>
+              </a:ext>
+            </a:extLst>
+          </p:cNvPr>
+          <p:cNvPicPr>
+            <a:picLocks noChangeAspect="1"/>
+          </p:cNvPicPr>
+          <p:nvPr/>
+        </p:nvPicPr>
+        <p:blipFill>
+          <a:blip r:embed="rId2">
+            <a:extLst>
+              <a:ext uri="{28A0092B-C50C-407E-A947-70E740481C1C}">
+                <a14:useLocalDpi xmlns:a14="http://schemas.microsoft.com/office/drawing/2010/main" val="0"/>
+              </a:ext>
+            </a:extLst>
+          </a:blip>
+          <a:stretch>
+            <a:fillRect/>
+          </a:stretch>
+        </p:blipFill>
+        <p:spPr>
+          <a:xfrm>
+            <a:off x="1267061" y="0"/>
+            <a:ext cx="9657877" cy="6858000"/>
+          </a:xfrm>
+          <a:prstGeom prst="rect">
+            <a:avLst/>
+          </a:prstGeom>
+        </p:spPr>
+      </p:pic>
+    </p:spTree>
+    <p:extLst>
+      <p:ext uri="{BB962C8B-B14F-4D97-AF65-F5344CB8AC3E}">
+        <p14:creationId xmlns:p14="http://schemas.microsoft.com/office/powerpoint/2010/main" val="27067023"/>
+      </p:ext>
+    </p:extLst>
+  </p:cSld>
+  <p:clrMapOvr>
+    <a:masterClrMapping/>
+  </p:clrMapOvr>
+</p:sld>
+</file>
+
+<file path=ppt/slides/slide17.xml><?xml version="1.0" encoding="utf-8"?>
+<p:sld xmlns:a="http://schemas.openxmlformats.org/drawingml/2006/main" xmlns:r="http://schemas.openxmlformats.org/officeDocument/2006/relationships" xmlns:p="http://schemas.openxmlformats.org/presentationml/2006/main">
+  <p:cSld>
+    <p:spTree>
+      <p:nvGrpSpPr>
+        <p:cNvPr id="1" name=""/>
+        <p:cNvGrpSpPr/>
+        <p:nvPr/>
+      </p:nvGrpSpPr>
+      <p:grpSpPr>
+        <a:xfrm>
+          <a:off x="0" y="0"/>
+          <a:ext cx="0" cy="0"/>
+          <a:chOff x="0" y="0"/>
+          <a:chExt cx="0" cy="0"/>
+        </a:xfrm>
+      </p:grpSpPr>
+      <p:pic>
+        <p:nvPicPr>
+          <p:cNvPr id="3" name="Imagem 2">
+            <a:extLst>
+              <a:ext uri="{FF2B5EF4-FFF2-40B4-BE49-F238E27FC236}">
+                <a16:creationId xmlns:a16="http://schemas.microsoft.com/office/drawing/2014/main" id="{116EE684-EF30-479E-A494-695343C19293}"/>
+              </a:ext>
+            </a:extLst>
+          </p:cNvPr>
+          <p:cNvPicPr>
+            <a:picLocks noChangeAspect="1"/>
+          </p:cNvPicPr>
+          <p:nvPr/>
+        </p:nvPicPr>
+        <p:blipFill>
+          <a:blip r:embed="rId2">
+            <a:extLst>
+              <a:ext uri="{28A0092B-C50C-407E-A947-70E740481C1C}">
+                <a14:useLocalDpi xmlns:a14="http://schemas.microsoft.com/office/drawing/2010/main" val="0"/>
+              </a:ext>
+            </a:extLst>
+          </a:blip>
+          <a:stretch>
+            <a:fillRect/>
+          </a:stretch>
+        </p:blipFill>
+        <p:spPr>
+          <a:xfrm>
+            <a:off x="1547955" y="0"/>
+            <a:ext cx="9096090" cy="6858000"/>
+          </a:xfrm>
+          <a:prstGeom prst="rect">
+            <a:avLst/>
+          </a:prstGeom>
+        </p:spPr>
+      </p:pic>
+    </p:spTree>
+    <p:extLst>
+      <p:ext uri="{BB962C8B-B14F-4D97-AF65-F5344CB8AC3E}">
+        <p14:creationId xmlns:p14="http://schemas.microsoft.com/office/powerpoint/2010/main" val="1961207309"/>
+      </p:ext>
+    </p:extLst>
+  </p:cSld>
+  <p:clrMapOvr>
+    <a:masterClrMapping/>
+  </p:clrMapOvr>
+</p:sld>
+</file>
+
+<file path=ppt/slides/slide18.xml><?xml version="1.0" encoding="utf-8"?>
+<p:sld xmlns:a="http://schemas.openxmlformats.org/drawingml/2006/main" xmlns:r="http://schemas.openxmlformats.org/officeDocument/2006/relationships" xmlns:p="http://schemas.openxmlformats.org/presentationml/2006/main">
+  <p:cSld>
+    <p:spTree>
+      <p:nvGrpSpPr>
+        <p:cNvPr id="1" name=""/>
+        <p:cNvGrpSpPr/>
+        <p:nvPr/>
+      </p:nvGrpSpPr>
+      <p:grpSpPr>
+        <a:xfrm>
+          <a:off x="0" y="0"/>
+          <a:ext cx="0" cy="0"/>
+          <a:chOff x="0" y="0"/>
+          <a:chExt cx="0" cy="0"/>
+        </a:xfrm>
+      </p:grpSpPr>
       <p:sp>
         <p:nvSpPr>
           <p:cNvPr id="3" name="Espaço Reservado para Conteúdo 2">
@@ -7116,7 +7250,7 @@
 </p:sld>
 </file>
 
-<file path=ppt/slides/slide17.xml><?xml version="1.0" encoding="utf-8"?>
+<file path=ppt/slides/slide19.xml><?xml version="1.0" encoding="utf-8"?>
 <p:sld xmlns:a="http://schemas.openxmlformats.org/drawingml/2006/main" xmlns:r="http://schemas.openxmlformats.org/officeDocument/2006/relationships" xmlns:p="http://schemas.openxmlformats.org/presentationml/2006/main">
   <p:cSld>
     <p:spTree>

</xml_diff>